<commit_message>
More changes to z-test module
</commit_message>
<xml_diff>
--- a/modules/1_Sample_Z/PPT1.pptx
+++ b/modules/1_Sample_Z/PPT1.pptx
@@ -4238,7 +4238,7 @@
                             </p:stCondLst>
                             <p:childTnLst>
                               <p:par>
-                                <p:cTn id="5" presetID="10" presetClass="entr" presetSubtype="0" fill="hold" grpId="0" nodeType="clickEffect">
+                                <p:cTn id="5" presetID="1" presetClass="entr" presetSubtype="0" fill="hold" grpId="0" nodeType="clickEffect">
                                   <p:stCondLst>
                                     <p:cond delay="0"/>
                                   </p:stCondLst>
@@ -4265,39 +4265,18 @@
                                         <p:strVal val="visible"/>
                                       </p:to>
                                     </p:set>
-                                    <p:animEffect transition="in" filter="fade">
-                                      <p:cBhvr>
-                                        <p:cTn id="7" dur="1000"/>
-                                        <p:tgtEl>
-                                          <p:spTgt spid="176133">
-                                            <p:txEl>
-                                              <p:pRg st="0" end="0"/>
-                                            </p:txEl>
-                                          </p:spTgt>
-                                        </p:tgtEl>
-                                      </p:cBhvr>
-                                    </p:animEffect>
                                   </p:childTnLst>
                                 </p:cTn>
                               </p:par>
-                            </p:childTnLst>
-                          </p:cTn>
-                        </p:par>
-                        <p:par>
-                          <p:cTn id="8" fill="hold">
-                            <p:stCondLst>
-                              <p:cond delay="1000"/>
-                            </p:stCondLst>
-                            <p:childTnLst>
                               <p:par>
-                                <p:cTn id="9" presetID="10" presetClass="entr" presetSubtype="0" fill="hold" grpId="0" nodeType="afterEffect">
+                                <p:cTn id="7" presetID="1" presetClass="entr" presetSubtype="0" fill="hold" grpId="0" nodeType="withEffect">
                                   <p:stCondLst>
                                     <p:cond delay="0"/>
                                   </p:stCondLst>
                                   <p:childTnLst>
                                     <p:set>
                                       <p:cBhvr>
-                                        <p:cTn id="10" dur="1" fill="hold">
+                                        <p:cTn id="8" dur="1" fill="hold">
                                           <p:stCondLst>
                                             <p:cond delay="0"/>
                                           </p:stCondLst>
@@ -4317,39 +4296,18 @@
                                         <p:strVal val="visible"/>
                                       </p:to>
                                     </p:set>
-                                    <p:animEffect transition="in" filter="fade">
-                                      <p:cBhvr>
-                                        <p:cTn id="11" dur="1000"/>
-                                        <p:tgtEl>
-                                          <p:spTgt spid="176133">
-                                            <p:txEl>
-                                              <p:pRg st="1" end="1"/>
-                                            </p:txEl>
-                                          </p:spTgt>
-                                        </p:tgtEl>
-                                      </p:cBhvr>
-                                    </p:animEffect>
                                   </p:childTnLst>
                                 </p:cTn>
                               </p:par>
-                            </p:childTnLst>
-                          </p:cTn>
-                        </p:par>
-                        <p:par>
-                          <p:cTn id="12" fill="hold">
-                            <p:stCondLst>
-                              <p:cond delay="2000"/>
-                            </p:stCondLst>
-                            <p:childTnLst>
                               <p:par>
-                                <p:cTn id="13" presetID="10" presetClass="entr" presetSubtype="0" fill="hold" grpId="0" nodeType="afterEffect">
+                                <p:cTn id="9" presetID="1" presetClass="entr" presetSubtype="0" fill="hold" grpId="0" nodeType="withEffect">
                                   <p:stCondLst>
                                     <p:cond delay="0"/>
                                   </p:stCondLst>
                                   <p:childTnLst>
                                     <p:set>
                                       <p:cBhvr>
-                                        <p:cTn id="14" dur="1" fill="hold">
+                                        <p:cTn id="10" dur="1" fill="hold">
                                           <p:stCondLst>
                                             <p:cond delay="0"/>
                                           </p:stCondLst>
@@ -4369,48 +4327,18 @@
                                         <p:strVal val="visible"/>
                                       </p:to>
                                     </p:set>
-                                    <p:animEffect transition="in" filter="fade">
-                                      <p:cBhvr>
-                                        <p:cTn id="15" dur="1000"/>
-                                        <p:tgtEl>
-                                          <p:spTgt spid="176133">
-                                            <p:txEl>
-                                              <p:pRg st="2" end="2"/>
-                                            </p:txEl>
-                                          </p:spTgt>
-                                        </p:tgtEl>
-                                      </p:cBhvr>
-                                    </p:animEffect>
                                   </p:childTnLst>
                                 </p:cTn>
                               </p:par>
-                            </p:childTnLst>
-                          </p:cTn>
-                        </p:par>
-                      </p:childTnLst>
-                    </p:cTn>
-                  </p:par>
-                  <p:par>
-                    <p:cTn id="16" fill="hold">
-                      <p:stCondLst>
-                        <p:cond delay="indefinite"/>
-                      </p:stCondLst>
-                      <p:childTnLst>
-                        <p:par>
-                          <p:cTn id="17" fill="hold">
-                            <p:stCondLst>
-                              <p:cond delay="0"/>
-                            </p:stCondLst>
-                            <p:childTnLst>
                               <p:par>
-                                <p:cTn id="18" presetID="10" presetClass="entr" presetSubtype="0" fill="hold" grpId="0" nodeType="clickEffect">
+                                <p:cTn id="11" presetID="1" presetClass="entr" presetSubtype="0" fill="hold" grpId="0" nodeType="withEffect">
                                   <p:stCondLst>
                                     <p:cond delay="0"/>
                                   </p:stCondLst>
                                   <p:childTnLst>
                                     <p:set>
                                       <p:cBhvr>
-                                        <p:cTn id="19" dur="1" fill="hold">
+                                        <p:cTn id="12" dur="1" fill="hold">
                                           <p:stCondLst>
                                             <p:cond delay="0"/>
                                           </p:stCondLst>
@@ -4430,83 +4358,18 @@
                                         <p:strVal val="visible"/>
                                       </p:to>
                                     </p:set>
-                                    <p:animEffect transition="in" filter="fade">
-                                      <p:cBhvr>
-                                        <p:cTn id="20" dur="1000"/>
-                                        <p:tgtEl>
-                                          <p:spTgt spid="176133">
-                                            <p:txEl>
-                                              <p:pRg st="3" end="3"/>
-                                            </p:txEl>
-                                          </p:spTgt>
-                                        </p:tgtEl>
-                                      </p:cBhvr>
-                                    </p:animEffect>
                                   </p:childTnLst>
                                 </p:cTn>
                               </p:par>
                               <p:par>
-                                <p:cTn id="21" presetID="10" presetClass="entr" presetSubtype="0" fill="hold" grpId="0" nodeType="withEffect">
+                                <p:cTn id="13" presetID="1" presetClass="entr" presetSubtype="0" fill="hold" grpId="0" nodeType="withEffect">
                                   <p:stCondLst>
                                     <p:cond delay="0"/>
                                   </p:stCondLst>
                                   <p:childTnLst>
                                     <p:set>
                                       <p:cBhvr>
-                                        <p:cTn id="22" dur="1" fill="hold">
-                                          <p:stCondLst>
-                                            <p:cond delay="0"/>
-                                          </p:stCondLst>
-                                        </p:cTn>
-                                        <p:tgtEl>
-                                          <p:spTgt spid="176131"/>
-                                        </p:tgtEl>
-                                        <p:attrNameLst>
-                                          <p:attrName>style.visibility</p:attrName>
-                                        </p:attrNameLst>
-                                      </p:cBhvr>
-                                      <p:to>
-                                        <p:strVal val="visible"/>
-                                      </p:to>
-                                    </p:set>
-                                    <p:animEffect transition="in" filter="fade">
-                                      <p:cBhvr>
-                                        <p:cTn id="23" dur="1000"/>
-                                        <p:tgtEl>
-                                          <p:spTgt spid="176131"/>
-                                        </p:tgtEl>
-                                      </p:cBhvr>
-                                    </p:animEffect>
-                                  </p:childTnLst>
-                                </p:cTn>
-                              </p:par>
-                            </p:childTnLst>
-                          </p:cTn>
-                        </p:par>
-                      </p:childTnLst>
-                    </p:cTn>
-                  </p:par>
-                  <p:par>
-                    <p:cTn id="24" fill="hold">
-                      <p:stCondLst>
-                        <p:cond delay="indefinite"/>
-                      </p:stCondLst>
-                      <p:childTnLst>
-                        <p:par>
-                          <p:cTn id="25" fill="hold">
-                            <p:stCondLst>
-                              <p:cond delay="0"/>
-                            </p:stCondLst>
-                            <p:childTnLst>
-                              <p:par>
-                                <p:cTn id="26" presetID="10" presetClass="entr" presetSubtype="0" fill="hold" grpId="0" nodeType="clickEffect">
-                                  <p:stCondLst>
-                                    <p:cond delay="0"/>
-                                  </p:stCondLst>
-                                  <p:childTnLst>
-                                    <p:set>
-                                      <p:cBhvr>
-                                        <p:cTn id="27" dur="1" fill="hold">
+                                        <p:cTn id="14" dur="1" fill="hold">
                                           <p:stCondLst>
                                             <p:cond delay="0"/>
                                           </p:stCondLst>
@@ -4526,48 +4389,18 @@
                                         <p:strVal val="visible"/>
                                       </p:to>
                                     </p:set>
-                                    <p:animEffect transition="in" filter="fade">
-                                      <p:cBhvr>
-                                        <p:cTn id="28" dur="1000"/>
-                                        <p:tgtEl>
-                                          <p:spTgt spid="176133">
-                                            <p:txEl>
-                                              <p:pRg st="4" end="4"/>
-                                            </p:txEl>
-                                          </p:spTgt>
-                                        </p:tgtEl>
-                                      </p:cBhvr>
-                                    </p:animEffect>
                                   </p:childTnLst>
                                 </p:cTn>
                               </p:par>
-                            </p:childTnLst>
-                          </p:cTn>
-                        </p:par>
-                      </p:childTnLst>
-                    </p:cTn>
-                  </p:par>
-                  <p:par>
-                    <p:cTn id="29" fill="hold">
-                      <p:stCondLst>
-                        <p:cond delay="indefinite"/>
-                      </p:stCondLst>
-                      <p:childTnLst>
-                        <p:par>
-                          <p:cTn id="30" fill="hold">
-                            <p:stCondLst>
-                              <p:cond delay="0"/>
-                            </p:stCondLst>
-                            <p:childTnLst>
                               <p:par>
-                                <p:cTn id="31" presetID="10" presetClass="entr" presetSubtype="0" fill="hold" grpId="0" nodeType="clickEffect">
+                                <p:cTn id="15" presetID="1" presetClass="entr" presetSubtype="0" fill="hold" grpId="0" nodeType="withEffect">
                                   <p:stCondLst>
                                     <p:cond delay="0"/>
                                   </p:stCondLst>
                                   <p:childTnLst>
                                     <p:set>
                                       <p:cBhvr>
-                                        <p:cTn id="32" dur="1" fill="hold">
+                                        <p:cTn id="16" dur="1" fill="hold">
                                           <p:stCondLst>
                                             <p:cond delay="0"/>
                                           </p:stCondLst>
@@ -4587,39 +4420,18 @@
                                         <p:strVal val="visible"/>
                                       </p:to>
                                     </p:set>
-                                    <p:animEffect transition="in" filter="fade">
-                                      <p:cBhvr>
-                                        <p:cTn id="33" dur="1000"/>
-                                        <p:tgtEl>
-                                          <p:spTgt spid="176133">
-                                            <p:txEl>
-                                              <p:pRg st="5" end="5"/>
-                                            </p:txEl>
-                                          </p:spTgt>
-                                        </p:tgtEl>
-                                      </p:cBhvr>
-                                    </p:animEffect>
                                   </p:childTnLst>
                                 </p:cTn>
                               </p:par>
-                            </p:childTnLst>
-                          </p:cTn>
-                        </p:par>
-                        <p:par>
-                          <p:cTn id="34" fill="hold">
-                            <p:stCondLst>
-                              <p:cond delay="1000"/>
-                            </p:stCondLst>
-                            <p:childTnLst>
                               <p:par>
-                                <p:cTn id="35" presetID="10" presetClass="entr" presetSubtype="0" fill="hold" grpId="0" nodeType="afterEffect">
+                                <p:cTn id="17" presetID="1" presetClass="entr" presetSubtype="0" fill="hold" grpId="0" nodeType="withEffect">
                                   <p:stCondLst>
                                     <p:cond delay="0"/>
                                   </p:stCondLst>
                                   <p:childTnLst>
                                     <p:set>
                                       <p:cBhvr>
-                                        <p:cTn id="36" dur="1" fill="hold">
+                                        <p:cTn id="18" dur="1" fill="hold">
                                           <p:stCondLst>
                                             <p:cond delay="0"/>
                                           </p:stCondLst>
@@ -4639,39 +4451,18 @@
                                         <p:strVal val="visible"/>
                                       </p:to>
                                     </p:set>
-                                    <p:animEffect transition="in" filter="fade">
-                                      <p:cBhvr>
-                                        <p:cTn id="37" dur="1000"/>
-                                        <p:tgtEl>
-                                          <p:spTgt spid="176133">
-                                            <p:txEl>
-                                              <p:pRg st="6" end="6"/>
-                                            </p:txEl>
-                                          </p:spTgt>
-                                        </p:tgtEl>
-                                      </p:cBhvr>
-                                    </p:animEffect>
                                   </p:childTnLst>
                                 </p:cTn>
                               </p:par>
-                            </p:childTnLst>
-                          </p:cTn>
-                        </p:par>
-                        <p:par>
-                          <p:cTn id="38" fill="hold">
-                            <p:stCondLst>
-                              <p:cond delay="2000"/>
-                            </p:stCondLst>
-                            <p:childTnLst>
                               <p:par>
-                                <p:cTn id="39" presetID="10" presetClass="entr" presetSubtype="0" fill="hold" grpId="0" nodeType="afterEffect">
+                                <p:cTn id="19" presetID="1" presetClass="entr" presetSubtype="0" fill="hold" grpId="0" nodeType="withEffect">
                                   <p:stCondLst>
                                     <p:cond delay="0"/>
                                   </p:stCondLst>
                                   <p:childTnLst>
                                     <p:set>
                                       <p:cBhvr>
-                                        <p:cTn id="40" dur="1" fill="hold">
+                                        <p:cTn id="20" dur="1" fill="hold">
                                           <p:stCondLst>
                                             <p:cond delay="0"/>
                                           </p:stCondLst>
@@ -4691,39 +4482,18 @@
                                         <p:strVal val="visible"/>
                                       </p:to>
                                     </p:set>
-                                    <p:animEffect transition="in" filter="fade">
-                                      <p:cBhvr>
-                                        <p:cTn id="41" dur="1000"/>
-                                        <p:tgtEl>
-                                          <p:spTgt spid="176133">
-                                            <p:txEl>
-                                              <p:pRg st="7" end="7"/>
-                                            </p:txEl>
-                                          </p:spTgt>
-                                        </p:tgtEl>
-                                      </p:cBhvr>
-                                    </p:animEffect>
                                   </p:childTnLst>
                                 </p:cTn>
                               </p:par>
-                            </p:childTnLst>
-                          </p:cTn>
-                        </p:par>
-                        <p:par>
-                          <p:cTn id="42" fill="hold">
-                            <p:stCondLst>
-                              <p:cond delay="3000"/>
-                            </p:stCondLst>
-                            <p:childTnLst>
                               <p:par>
-                                <p:cTn id="43" presetID="10" presetClass="entr" presetSubtype="0" fill="hold" grpId="0" nodeType="afterEffect">
+                                <p:cTn id="21" presetID="1" presetClass="entr" presetSubtype="0" fill="hold" grpId="0" nodeType="withEffect">
                                   <p:stCondLst>
                                     <p:cond delay="0"/>
                                   </p:stCondLst>
                                   <p:childTnLst>
                                     <p:set>
                                       <p:cBhvr>
-                                        <p:cTn id="44" dur="1" fill="hold">
+                                        <p:cTn id="22" dur="1" fill="hold">
                                           <p:stCondLst>
                                             <p:cond delay="0"/>
                                           </p:stCondLst>
@@ -4743,48 +4513,18 @@
                                         <p:strVal val="visible"/>
                                       </p:to>
                                     </p:set>
-                                    <p:animEffect transition="in" filter="fade">
-                                      <p:cBhvr>
-                                        <p:cTn id="45" dur="1000"/>
-                                        <p:tgtEl>
-                                          <p:spTgt spid="176133">
-                                            <p:txEl>
-                                              <p:pRg st="8" end="8"/>
-                                            </p:txEl>
-                                          </p:spTgt>
-                                        </p:tgtEl>
-                                      </p:cBhvr>
-                                    </p:animEffect>
                                   </p:childTnLst>
                                 </p:cTn>
                               </p:par>
-                            </p:childTnLst>
-                          </p:cTn>
-                        </p:par>
-                      </p:childTnLst>
-                    </p:cTn>
-                  </p:par>
-                  <p:par>
-                    <p:cTn id="46" fill="hold">
-                      <p:stCondLst>
-                        <p:cond delay="indefinite"/>
-                      </p:stCondLst>
-                      <p:childTnLst>
-                        <p:par>
-                          <p:cTn id="47" fill="hold">
-                            <p:stCondLst>
-                              <p:cond delay="0"/>
-                            </p:stCondLst>
-                            <p:childTnLst>
                               <p:par>
-                                <p:cTn id="48" presetID="10" presetClass="entr" presetSubtype="0" fill="hold" grpId="0" nodeType="clickEffect">
+                                <p:cTn id="23" presetID="1" presetClass="entr" presetSubtype="0" fill="hold" grpId="0" nodeType="withEffect">
                                   <p:stCondLst>
                                     <p:cond delay="0"/>
                                   </p:stCondLst>
                                   <p:childTnLst>
                                     <p:set>
                                       <p:cBhvr>
-                                        <p:cTn id="49" dur="1" fill="hold">
+                                        <p:cTn id="24" dur="1" fill="hold">
                                           <p:stCondLst>
                                             <p:cond delay="0"/>
                                           </p:stCondLst>
@@ -4804,48 +4544,18 @@
                                         <p:strVal val="visible"/>
                                       </p:to>
                                     </p:set>
-                                    <p:animEffect transition="in" filter="fade">
-                                      <p:cBhvr>
-                                        <p:cTn id="50" dur="1000"/>
-                                        <p:tgtEl>
-                                          <p:spTgt spid="176133">
-                                            <p:txEl>
-                                              <p:pRg st="9" end="9"/>
-                                            </p:txEl>
-                                          </p:spTgt>
-                                        </p:tgtEl>
-                                      </p:cBhvr>
-                                    </p:animEffect>
                                   </p:childTnLst>
                                 </p:cTn>
                               </p:par>
-                            </p:childTnLst>
-                          </p:cTn>
-                        </p:par>
-                      </p:childTnLst>
-                    </p:cTn>
-                  </p:par>
-                  <p:par>
-                    <p:cTn id="51" fill="hold">
-                      <p:stCondLst>
-                        <p:cond delay="indefinite"/>
-                      </p:stCondLst>
-                      <p:childTnLst>
-                        <p:par>
-                          <p:cTn id="52" fill="hold">
-                            <p:stCondLst>
-                              <p:cond delay="0"/>
-                            </p:stCondLst>
-                            <p:childTnLst>
                               <p:par>
-                                <p:cTn id="53" presetID="10" presetClass="entr" presetSubtype="0" fill="hold" grpId="0" nodeType="clickEffect">
+                                <p:cTn id="25" presetID="1" presetClass="entr" presetSubtype="0" fill="hold" grpId="0" nodeType="withEffect">
                                   <p:stCondLst>
                                     <p:cond delay="0"/>
                                   </p:stCondLst>
                                   <p:childTnLst>
                                     <p:set>
                                       <p:cBhvr>
-                                        <p:cTn id="54" dur="1" fill="hold">
+                                        <p:cTn id="26" dur="1" fill="hold">
                                           <p:stCondLst>
                                             <p:cond delay="0"/>
                                           </p:stCondLst>
@@ -4865,30 +4575,45 @@
                                         <p:strVal val="visible"/>
                                       </p:to>
                                     </p:set>
-                                    <p:animEffect transition="in" filter="fade">
-                                      <p:cBhvr>
-                                        <p:cTn id="55" dur="1000"/>
-                                        <p:tgtEl>
-                                          <p:spTgt spid="176133">
-                                            <p:txEl>
-                                              <p:pRg st="10" end="10"/>
-                                            </p:txEl>
-                                          </p:spTgt>
-                                        </p:tgtEl>
-                                      </p:cBhvr>
-                                    </p:animEffect>
                                   </p:childTnLst>
                                 </p:cTn>
                               </p:par>
                               <p:par>
-                                <p:cTn id="56" presetID="10" presetClass="entr" presetSubtype="0" fill="hold" grpId="0" nodeType="withEffect">
+                                <p:cTn id="27" presetID="1" presetClass="entr" presetSubtype="0" fill="hold" grpId="0" nodeType="withEffect">
                                   <p:stCondLst>
                                     <p:cond delay="0"/>
                                   </p:stCondLst>
                                   <p:childTnLst>
                                     <p:set>
                                       <p:cBhvr>
-                                        <p:cTn id="57" dur="1" fill="hold">
+                                        <p:cTn id="28" dur="1" fill="hold">
+                                          <p:stCondLst>
+                                            <p:cond delay="0"/>
+                                          </p:stCondLst>
+                                        </p:cTn>
+                                        <p:tgtEl>
+                                          <p:spTgt spid="176131"/>
+                                        </p:tgtEl>
+                                        <p:attrNameLst>
+                                          <p:attrName>style.visibility</p:attrName>
+                                        </p:attrNameLst>
+                                      </p:cBhvr>
+                                      <p:to>
+                                        <p:strVal val="visible"/>
+                                      </p:to>
+                                    </p:set>
+                                  </p:childTnLst>
+                                </p:cTn>
+                              </p:par>
+                              <p:par>
+                                <p:cTn id="29" presetID="1" presetClass="entr" presetSubtype="0" fill="hold" grpId="0" nodeType="withEffect">
+                                  <p:stCondLst>
+                                    <p:cond delay="0"/>
+                                  </p:stCondLst>
+                                  <p:childTnLst>
+                                    <p:set>
+                                      <p:cBhvr>
+                                        <p:cTn id="30" dur="1" fill="hold">
                                           <p:stCondLst>
                                             <p:cond delay="0"/>
                                           </p:stCondLst>
@@ -4904,14 +4629,6 @@
                                         <p:strVal val="visible"/>
                                       </p:to>
                                     </p:set>
-                                    <p:animEffect transition="in" filter="fade">
-                                      <p:cBhvr>
-                                        <p:cTn id="58" dur="1000"/>
-                                        <p:tgtEl>
-                                          <p:spTgt spid="176130"/>
-                                        </p:tgtEl>
-                                      </p:cBhvr>
-                                    </p:animEffect>
                                   </p:childTnLst>
                                 </p:cTn>
                               </p:par>
@@ -4945,7 +4662,7 @@
     <p:bldLst>
       <p:bldP spid="176130" grpId="0" animBg="1"/>
       <p:bldP spid="176131" grpId="0" animBg="1"/>
-      <p:bldP spid="176133" grpId="0" uiExpand="1" build="p" autoUpdateAnimBg="0"/>
+      <p:bldP spid="176133" grpId="0" uiExpand="1" build="p"/>
     </p:bldLst>
   </p:timing>
 </p:sld>

</xml_diff>

<commit_message>
Updated 11 steps handout
</commit_message>
<xml_diff>
--- a/modules/1_Sample_Z/PPT1.pptx
+++ b/modules/1_Sample_Z/PPT1.pptx
@@ -1,17 +1,21 @@
 
 <file path=ppt/presentation.xml><?xml version="1.0" encoding="utf-8"?>
-<p:presentation xmlns:a="http://schemas.openxmlformats.org/drawingml/2006/main" xmlns:r="http://schemas.openxmlformats.org/officeDocument/2006/relationships" xmlns:p="http://schemas.openxmlformats.org/presentationml/2006/main" showSpecialPlsOnTitleSld="0" strictFirstAndLastChars="0" saveSubsetFonts="1">
+<p:presentation xmlns:a="http://schemas.openxmlformats.org/drawingml/2006/main" xmlns:r="http://schemas.openxmlformats.org/officeDocument/2006/relationships" xmlns:p="http://schemas.openxmlformats.org/presentationml/2006/main" strictFirstAndLastChars="0" saveSubsetFonts="1">
   <p:sldMasterIdLst>
     <p:sldMasterId id="2147483648" r:id="rId1"/>
   </p:sldMasterIdLst>
   <p:notesMasterIdLst>
-    <p:notesMasterId r:id="rId3"/>
+    <p:notesMasterId r:id="rId4"/>
   </p:notesMasterIdLst>
+  <p:handoutMasterIdLst>
+    <p:handoutMasterId r:id="rId5"/>
+  </p:handoutMasterIdLst>
   <p:sldIdLst>
     <p:sldId id="399" r:id="rId2"/>
+    <p:sldId id="400" r:id="rId3"/>
   </p:sldIdLst>
   <p:sldSz cx="9144000" cy="6858000" type="screen4x3"/>
-  <p:notesSz cx="6858000" cy="9144000"/>
+  <p:notesSz cx="7023100" cy="9309100"/>
   <p:defaultTextStyle>
     <a:defPPr>
       <a:defRPr lang="en-US"/>
@@ -154,12 +158,12 @@
     </p:ext>
     <p:ext uri="{2D200454-40CA-4A62-9FC3-DE9A4176ACB9}">
       <p15:notesGuideLst xmlns:p15="http://schemas.microsoft.com/office/powerpoint/2012/main">
-        <p15:guide id="1" orient="horz" pos="2880">
+        <p15:guide id="1" orient="horz" pos="2932" userDrawn="1">
           <p15:clr>
             <a:srgbClr val="A4A3A4"/>
           </p15:clr>
         </p15:guide>
-        <p15:guide id="2" pos="2160">
+        <p15:guide id="2" pos="2212" userDrawn="1">
           <p15:clr>
             <a:srgbClr val="A4A3A4"/>
           </p15:clr>
@@ -168,6 +172,172 @@
     </p:ext>
   </p:extLst>
 </p:presentation>
+</file>
+
+<file path=ppt/handoutMasters/handoutMaster1.xml><?xml version="1.0" encoding="utf-8"?>
+<p:handoutMaster xmlns:a="http://schemas.openxmlformats.org/drawingml/2006/main" xmlns:r="http://schemas.openxmlformats.org/officeDocument/2006/relationships" xmlns:p="http://schemas.openxmlformats.org/presentationml/2006/main">
+  <p:cSld>
+    <p:bg>
+      <p:bgRef idx="1001">
+        <a:schemeClr val="bg1"/>
+      </p:bgRef>
+    </p:bg>
+    <p:spTree>
+      <p:nvGrpSpPr>
+        <p:cNvPr id="1" name=""/>
+        <p:cNvGrpSpPr/>
+        <p:nvPr/>
+      </p:nvGrpSpPr>
+      <p:grpSpPr>
+        <a:xfrm>
+          <a:off x="0" y="0"/>
+          <a:ext cx="0" cy="0"/>
+          <a:chOff x="0" y="0"/>
+          <a:chExt cx="0" cy="0"/>
+        </a:xfrm>
+      </p:grpSpPr>
+      <p:sp>
+        <p:nvSpPr>
+          <p:cNvPr id="2" name="Header Placeholder 1"/>
+          <p:cNvSpPr>
+            <a:spLocks noGrp="1"/>
+          </p:cNvSpPr>
+          <p:nvPr>
+            <p:ph type="hdr" sz="quarter"/>
+          </p:nvPr>
+        </p:nvSpPr>
+        <p:spPr>
+          <a:xfrm>
+            <a:off x="0" y="0"/>
+            <a:ext cx="3043343" cy="467072"/>
+          </a:xfrm>
+          <a:prstGeom prst="rect">
+            <a:avLst/>
+          </a:prstGeom>
+        </p:spPr>
+        <p:txBody>
+          <a:bodyPr vert="horz" lIns="93324" tIns="46662" rIns="93324" bIns="46662" rtlCol="0"/>
+          <a:lstStyle>
+            <a:lvl1pPr algn="l">
+              <a:defRPr sz="1200"/>
+            </a:lvl1pPr>
+          </a:lstStyle>
+          <a:p>
+            <a:endParaRPr lang="en-US"/>
+          </a:p>
+        </p:txBody>
+      </p:sp>
+      <p:sp>
+        <p:nvSpPr>
+          <p:cNvPr id="3" name="Date Placeholder 2"/>
+          <p:cNvSpPr>
+            <a:spLocks noGrp="1"/>
+          </p:cNvSpPr>
+          <p:nvPr>
+            <p:ph type="dt" sz="quarter" idx="1"/>
+          </p:nvPr>
+        </p:nvSpPr>
+        <p:spPr>
+          <a:xfrm>
+            <a:off x="3978132" y="0"/>
+            <a:ext cx="3043343" cy="467072"/>
+          </a:xfrm>
+          <a:prstGeom prst="rect">
+            <a:avLst/>
+          </a:prstGeom>
+        </p:spPr>
+        <p:txBody>
+          <a:bodyPr vert="horz" lIns="93324" tIns="46662" rIns="93324" bIns="46662" rtlCol="0"/>
+          <a:lstStyle>
+            <a:lvl1pPr algn="r">
+              <a:defRPr sz="1200"/>
+            </a:lvl1pPr>
+          </a:lstStyle>
+          <a:p>
+            <a:fld id="{4C9D7A48-4978-4AFC-85D6-CFF3A7AE92F2}" type="datetimeFigureOut">
+              <a:rPr lang="en-US" smtClean="0"/>
+              <a:t>10/31/2016</a:t>
+            </a:fld>
+            <a:endParaRPr lang="en-US"/>
+          </a:p>
+        </p:txBody>
+      </p:sp>
+      <p:sp>
+        <p:nvSpPr>
+          <p:cNvPr id="4" name="Footer Placeholder 3"/>
+          <p:cNvSpPr>
+            <a:spLocks noGrp="1"/>
+          </p:cNvSpPr>
+          <p:nvPr>
+            <p:ph type="ftr" sz="quarter" idx="2"/>
+          </p:nvPr>
+        </p:nvSpPr>
+        <p:spPr>
+          <a:xfrm>
+            <a:off x="0" y="8842030"/>
+            <a:ext cx="3043343" cy="467071"/>
+          </a:xfrm>
+          <a:prstGeom prst="rect">
+            <a:avLst/>
+          </a:prstGeom>
+        </p:spPr>
+        <p:txBody>
+          <a:bodyPr vert="horz" lIns="93324" tIns="46662" rIns="93324" bIns="46662" rtlCol="0" anchor="b"/>
+          <a:lstStyle>
+            <a:lvl1pPr algn="l">
+              <a:defRPr sz="1200"/>
+            </a:lvl1pPr>
+          </a:lstStyle>
+          <a:p>
+            <a:endParaRPr lang="en-US"/>
+          </a:p>
+        </p:txBody>
+      </p:sp>
+      <p:sp>
+        <p:nvSpPr>
+          <p:cNvPr id="5" name="Slide Number Placeholder 4"/>
+          <p:cNvSpPr>
+            <a:spLocks noGrp="1"/>
+          </p:cNvSpPr>
+          <p:nvPr>
+            <p:ph type="sldNum" sz="quarter" idx="3"/>
+          </p:nvPr>
+        </p:nvSpPr>
+        <p:spPr>
+          <a:xfrm>
+            <a:off x="3978132" y="8842030"/>
+            <a:ext cx="3043343" cy="467071"/>
+          </a:xfrm>
+          <a:prstGeom prst="rect">
+            <a:avLst/>
+          </a:prstGeom>
+        </p:spPr>
+        <p:txBody>
+          <a:bodyPr vert="horz" lIns="93324" tIns="46662" rIns="93324" bIns="46662" rtlCol="0" anchor="b"/>
+          <a:lstStyle>
+            <a:lvl1pPr algn="r">
+              <a:defRPr sz="1200"/>
+            </a:lvl1pPr>
+          </a:lstStyle>
+          <a:p>
+            <a:fld id="{0FEB2D52-7A3C-4F98-90FC-BB040A5DC049}" type="slidenum">
+              <a:rPr lang="en-US" smtClean="0"/>
+              <a:t>‹#›</a:t>
+            </a:fld>
+            <a:endParaRPr lang="en-US"/>
+          </a:p>
+        </p:txBody>
+      </p:sp>
+    </p:spTree>
+    <p:extLst>
+      <p:ext uri="{BB962C8B-B14F-4D97-AF65-F5344CB8AC3E}">
+        <p14:creationId xmlns:p14="http://schemas.microsoft.com/office/powerpoint/2010/main" val="506895992"/>
+      </p:ext>
+    </p:extLst>
+  </p:cSld>
+  <p:clrMap bg1="lt1" tx1="dk1" bg2="lt2" tx2="dk2" accent1="accent1" accent2="accent2" accent3="accent3" accent4="accent4" accent5="accent5" accent6="accent6" hlink="hlink" folHlink="folHlink"/>
+  <p:hf sldNum="0" hdr="0" ftr="0" dt="0"/>
+</p:handoutMaster>
 </file>
 
 <file path=ppt/notesMasters/notesMaster1.xml><?xml version="1.0" encoding="utf-8"?>
@@ -208,7 +378,7 @@
         <p:spPr bwMode="auto">
           <a:xfrm>
             <a:off x="0" y="0"/>
-            <a:ext cx="2971800" cy="457200"/>
+            <a:ext cx="3043343" cy="465455"/>
           </a:xfrm>
           <a:prstGeom prst="rect">
             <a:avLst/>
@@ -223,7 +393,7 @@
           <a:effectLst/>
         </p:spPr>
         <p:txBody>
-          <a:bodyPr vert="horz" wrap="square" lIns="91440" tIns="45720" rIns="91440" bIns="45720" numCol="1" anchor="t" anchorCtr="0" compatLnSpc="1">
+          <a:bodyPr vert="horz" wrap="square" lIns="93324" tIns="46662" rIns="93324" bIns="46662" numCol="1" anchor="t" anchorCtr="0" compatLnSpc="1">
             <a:prstTxWarp prst="textNoShape">
               <a:avLst/>
             </a:prstTxWarp>
@@ -250,8 +420,8 @@
         </p:nvSpPr>
         <p:spPr bwMode="auto">
           <a:xfrm>
-            <a:off x="3886200" y="0"/>
-            <a:ext cx="2971800" cy="457200"/>
+            <a:off x="3979757" y="0"/>
+            <a:ext cx="3043343" cy="465455"/>
           </a:xfrm>
           <a:prstGeom prst="rect">
             <a:avLst/>
@@ -266,7 +436,7 @@
           <a:effectLst/>
         </p:spPr>
         <p:txBody>
-          <a:bodyPr vert="horz" wrap="square" lIns="91440" tIns="45720" rIns="91440" bIns="45720" numCol="1" anchor="t" anchorCtr="0" compatLnSpc="1">
+          <a:bodyPr vert="horz" wrap="square" lIns="93324" tIns="46662" rIns="93324" bIns="46662" numCol="1" anchor="t" anchorCtr="0" compatLnSpc="1">
             <a:prstTxWarp prst="textNoShape">
               <a:avLst/>
             </a:prstTxWarp>
@@ -293,8 +463,8 @@
         </p:nvSpPr>
         <p:spPr bwMode="auto">
           <a:xfrm>
-            <a:off x="1143000" y="685800"/>
-            <a:ext cx="4572000" cy="3429000"/>
+            <a:off x="1184275" y="698500"/>
+            <a:ext cx="4654550" cy="3490913"/>
           </a:xfrm>
           <a:prstGeom prst="rect">
             <a:avLst/>
@@ -323,8 +493,8 @@
         </p:nvSpPr>
         <p:spPr bwMode="auto">
           <a:xfrm>
-            <a:off x="914400" y="4343400"/>
-            <a:ext cx="5029200" cy="4114800"/>
+            <a:off x="936414" y="4421823"/>
+            <a:ext cx="5150273" cy="4189095"/>
           </a:xfrm>
           <a:prstGeom prst="rect">
             <a:avLst/>
@@ -339,7 +509,7 @@
           <a:effectLst/>
         </p:spPr>
         <p:txBody>
-          <a:bodyPr vert="horz" wrap="square" lIns="91440" tIns="45720" rIns="91440" bIns="45720" numCol="1" anchor="t" anchorCtr="0" compatLnSpc="1">
+          <a:bodyPr vert="horz" wrap="square" lIns="93324" tIns="46662" rIns="93324" bIns="46662" numCol="1" anchor="t" anchorCtr="0" compatLnSpc="1">
             <a:prstTxWarp prst="textNoShape">
               <a:avLst/>
             </a:prstTxWarp>
@@ -394,8 +564,8 @@
         </p:nvSpPr>
         <p:spPr bwMode="auto">
           <a:xfrm>
-            <a:off x="0" y="8686800"/>
-            <a:ext cx="2971800" cy="457200"/>
+            <a:off x="0" y="8843645"/>
+            <a:ext cx="3043343" cy="465455"/>
           </a:xfrm>
           <a:prstGeom prst="rect">
             <a:avLst/>
@@ -410,7 +580,7 @@
           <a:effectLst/>
         </p:spPr>
         <p:txBody>
-          <a:bodyPr vert="horz" wrap="square" lIns="91440" tIns="45720" rIns="91440" bIns="45720" numCol="1" anchor="b" anchorCtr="0" compatLnSpc="1">
+          <a:bodyPr vert="horz" wrap="square" lIns="93324" tIns="46662" rIns="93324" bIns="46662" numCol="1" anchor="b" anchorCtr="0" compatLnSpc="1">
             <a:prstTxWarp prst="textNoShape">
               <a:avLst/>
             </a:prstTxWarp>
@@ -437,8 +607,8 @@
         </p:nvSpPr>
         <p:spPr bwMode="auto">
           <a:xfrm>
-            <a:off x="3886200" y="8686800"/>
-            <a:ext cx="2971800" cy="457200"/>
+            <a:off x="3979757" y="8843645"/>
+            <a:ext cx="3043343" cy="465455"/>
           </a:xfrm>
           <a:prstGeom prst="rect">
             <a:avLst/>
@@ -453,7 +623,7 @@
           <a:effectLst/>
         </p:spPr>
         <p:txBody>
-          <a:bodyPr vert="horz" wrap="square" lIns="91440" tIns="45720" rIns="91440" bIns="45720" numCol="1" anchor="b" anchorCtr="0" compatLnSpc="1">
+          <a:bodyPr vert="horz" wrap="square" lIns="93324" tIns="46662" rIns="93324" bIns="46662" numCol="1" anchor="b" anchorCtr="0" compatLnSpc="1">
             <a:prstTxWarp prst="textNoShape">
               <a:avLst/>
             </a:prstTxWarp>
@@ -481,6 +651,7 @@
     </p:extLst>
   </p:cSld>
   <p:clrMap bg1="lt1" tx1="dk1" bg2="lt2" tx2="dk2" accent1="accent1" accent2="accent2" accent3="accent3" accent4="accent4" accent5="accent5" accent6="accent6" hlink="hlink" folHlink="folHlink"/>
+  <p:hf sldNum="0" hdr="0" ftr="0" dt="0"/>
   <p:notesStyle>
     <a:lvl1pPr algn="l" rtl="0" eaLnBrk="0" fontAlgn="base" hangingPunct="0">
       <a:spcBef>
@@ -606,6 +777,67 @@
 </p:notesMaster>
 </file>
 
+<file path=ppt/notesSlides/notesSlide1.xml><?xml version="1.0" encoding="utf-8"?>
+<p:notes xmlns:a="http://schemas.openxmlformats.org/drawingml/2006/main" xmlns:r="http://schemas.openxmlformats.org/officeDocument/2006/relationships" xmlns:p="http://schemas.openxmlformats.org/presentationml/2006/main">
+  <p:cSld>
+    <p:spTree>
+      <p:nvGrpSpPr>
+        <p:cNvPr id="1" name=""/>
+        <p:cNvGrpSpPr/>
+        <p:nvPr/>
+      </p:nvGrpSpPr>
+      <p:grpSpPr>
+        <a:xfrm>
+          <a:off x="0" y="0"/>
+          <a:ext cx="0" cy="0"/>
+          <a:chOff x="0" y="0"/>
+          <a:chExt cx="0" cy="0"/>
+        </a:xfrm>
+      </p:grpSpPr>
+      <p:sp>
+        <p:nvSpPr>
+          <p:cNvPr id="2" name="Slide Image Placeholder 1"/>
+          <p:cNvSpPr>
+            <a:spLocks noGrp="1" noRot="1" noChangeAspect="1"/>
+          </p:cNvSpPr>
+          <p:nvPr>
+            <p:ph type="sldImg"/>
+          </p:nvPr>
+        </p:nvSpPr>
+        <p:spPr/>
+      </p:sp>
+      <p:sp>
+        <p:nvSpPr>
+          <p:cNvPr id="3" name="Notes Placeholder 2"/>
+          <p:cNvSpPr>
+            <a:spLocks noGrp="1"/>
+          </p:cNvSpPr>
+          <p:nvPr>
+            <p:ph type="body" idx="1"/>
+          </p:nvPr>
+        </p:nvSpPr>
+        <p:spPr/>
+        <p:txBody>
+          <a:bodyPr/>
+          <a:lstStyle/>
+          <a:p>
+            <a:endParaRPr lang="en-US"/>
+          </a:p>
+        </p:txBody>
+      </p:sp>
+    </p:spTree>
+    <p:extLst>
+      <p:ext uri="{BB962C8B-B14F-4D97-AF65-F5344CB8AC3E}">
+        <p14:creationId xmlns:p14="http://schemas.microsoft.com/office/powerpoint/2010/main" val="1946427235"/>
+      </p:ext>
+    </p:extLst>
+  </p:cSld>
+  <p:clrMapOvr>
+    <a:masterClrMapping/>
+  </p:clrMapOvr>
+</p:notes>
+</file>
+
 <file path=ppt/slideLayouts/slideLayout1.xml><?xml version="1.0" encoding="utf-8"?>
 <p:sldLayout xmlns:a="http://schemas.openxmlformats.org/drawingml/2006/main" xmlns:r="http://schemas.openxmlformats.org/officeDocument/2006/relationships" xmlns:p="http://schemas.openxmlformats.org/presentationml/2006/main" type="title" preserve="1">
   <p:cSld name="Title Slide">
@@ -3395,7 +3627,7 @@
     <p:sldLayoutId id="2147483658" r:id="rId10"/>
     <p:sldLayoutId id="2147483659" r:id="rId11"/>
   </p:sldLayoutIdLst>
-  <p:hf hdr="0" dt="0"/>
+  <p:hf sldNum="0" hdr="0" ftr="0" dt="0"/>
   <p:txStyles>
     <p:titleStyle>
       <a:lvl1pPr algn="ctr" rtl="0" eaLnBrk="0" fontAlgn="base" hangingPunct="0">
@@ -3782,57 +4014,6 @@
           <a:chExt cx="0" cy="0"/>
         </a:xfrm>
       </p:grpSpPr>
-      <p:sp>
-        <p:nvSpPr>
-          <p:cNvPr id="6" name="Footer Placeholder 4"/>
-          <p:cNvSpPr>
-            <a:spLocks noGrp="1"/>
-          </p:cNvSpPr>
-          <p:nvPr>
-            <p:ph type="ftr" sz="quarter" idx="11"/>
-          </p:nvPr>
-        </p:nvSpPr>
-        <p:spPr/>
-        <p:txBody>
-          <a:bodyPr/>
-          <a:lstStyle/>
-          <a:p>
-            <a:r>
-              <a:rPr lang="en-US" smtClean="0"/>
-              <a:t>Inference Concepts</a:t>
-            </a:r>
-            <a:endParaRPr lang="en-US"/>
-          </a:p>
-        </p:txBody>
-      </p:sp>
-      <p:sp>
-        <p:nvSpPr>
-          <p:cNvPr id="7" name="Slide Number Placeholder 5"/>
-          <p:cNvSpPr>
-            <a:spLocks noGrp="1"/>
-          </p:cNvSpPr>
-          <p:nvPr>
-            <p:ph type="sldNum" sz="quarter" idx="12"/>
-          </p:nvPr>
-        </p:nvSpPr>
-        <p:spPr/>
-        <p:txBody>
-          <a:bodyPr/>
-          <a:lstStyle/>
-          <a:p>
-            <a:r>
-              <a:rPr lang="en-US"/>
-              <a:t>Slide #</a:t>
-            </a:r>
-            <a:fld id="{B688EE58-D69A-40CA-ABEC-FF6860B42866}" type="slidenum">
-              <a:rPr lang="en-US"/>
-              <a:pPr/>
-              <a:t>1</a:t>
-            </a:fld>
-            <a:endParaRPr lang="en-US"/>
-          </a:p>
-        </p:txBody>
-      </p:sp>
       <p:sp>
         <p:nvSpPr>
           <p:cNvPr id="176130" name="Rectangle 2"/>
@@ -4663,6 +4844,863 @@
       <p:bldP spid="176130" grpId="0" animBg="1"/>
       <p:bldP spid="176131" grpId="0" animBg="1"/>
       <p:bldP spid="176133" grpId="0" uiExpand="1" build="p"/>
+    </p:bldLst>
+  </p:timing>
+</p:sld>
+</file>
+
+<file path=ppt/slides/slide2.xml><?xml version="1.0" encoding="utf-8"?>
+<p:sld xmlns:a="http://schemas.openxmlformats.org/drawingml/2006/main" xmlns:r="http://schemas.openxmlformats.org/officeDocument/2006/relationships" xmlns:p="http://schemas.openxmlformats.org/presentationml/2006/main" showMasterPhAnim="0">
+  <p:cSld>
+    <p:spTree>
+      <p:nvGrpSpPr>
+        <p:cNvPr id="1" name=""/>
+        <p:cNvGrpSpPr/>
+        <p:nvPr/>
+      </p:nvGrpSpPr>
+      <p:grpSpPr>
+        <a:xfrm>
+          <a:off x="0" y="0"/>
+          <a:ext cx="0" cy="0"/>
+          <a:chOff x="0" y="0"/>
+          <a:chExt cx="0" cy="0"/>
+        </a:xfrm>
+      </p:grpSpPr>
+      <p:sp>
+        <p:nvSpPr>
+          <p:cNvPr id="176130" name="Rectangle 2"/>
+          <p:cNvSpPr>
+            <a:spLocks noChangeArrowheads="1"/>
+          </p:cNvSpPr>
+          <p:nvPr/>
+        </p:nvSpPr>
+        <p:spPr bwMode="auto">
+          <a:xfrm>
+            <a:off x="0" y="5562600"/>
+            <a:ext cx="9144000" cy="762000"/>
+          </a:xfrm>
+          <a:prstGeom prst="rect">
+            <a:avLst/>
+          </a:prstGeom>
+          <a:solidFill>
+            <a:srgbClr val="FFFF00">
+              <a:alpha val="10000"/>
+            </a:srgbClr>
+          </a:solidFill>
+          <a:ln w="9525">
+            <a:noFill/>
+            <a:miter lim="800000"/>
+            <a:headEnd/>
+            <a:tailEnd/>
+          </a:ln>
+          <a:effectLst/>
+        </p:spPr>
+        <p:txBody>
+          <a:bodyPr wrap="none" anchor="ctr"/>
+          <a:lstStyle/>
+          <a:p>
+            <a:endParaRPr lang="en-US"/>
+          </a:p>
+        </p:txBody>
+      </p:sp>
+      <p:sp>
+        <p:nvSpPr>
+          <p:cNvPr id="176131" name="Rectangle 3"/>
+          <p:cNvSpPr>
+            <a:spLocks noChangeArrowheads="1"/>
+          </p:cNvSpPr>
+          <p:nvPr/>
+        </p:nvSpPr>
+        <p:spPr bwMode="auto">
+          <a:xfrm>
+            <a:off x="0" y="2514600"/>
+            <a:ext cx="9144000" cy="381000"/>
+          </a:xfrm>
+          <a:prstGeom prst="rect">
+            <a:avLst/>
+          </a:prstGeom>
+          <a:solidFill>
+            <a:srgbClr val="00FFFF">
+              <a:alpha val="10000"/>
+            </a:srgbClr>
+          </a:solidFill>
+          <a:ln w="9525">
+            <a:noFill/>
+            <a:miter lim="800000"/>
+            <a:headEnd/>
+            <a:tailEnd/>
+          </a:ln>
+          <a:effectLst/>
+        </p:spPr>
+        <p:txBody>
+          <a:bodyPr wrap="none" anchor="ctr"/>
+          <a:lstStyle/>
+          <a:p>
+            <a:endParaRPr lang="en-US"/>
+          </a:p>
+        </p:txBody>
+      </p:sp>
+      <p:sp>
+        <p:nvSpPr>
+          <p:cNvPr id="176132" name="Rectangle 4"/>
+          <p:cNvSpPr>
+            <a:spLocks noGrp="1" noChangeArrowheads="1"/>
+          </p:cNvSpPr>
+          <p:nvPr>
+            <p:ph type="title"/>
+          </p:nvPr>
+        </p:nvSpPr>
+        <p:spPr>
+          <a:xfrm>
+            <a:off x="228600" y="76200"/>
+            <a:ext cx="8686800" cy="838200"/>
+          </a:xfrm>
+        </p:spPr>
+        <p:txBody>
+          <a:bodyPr/>
+          <a:lstStyle/>
+          <a:p>
+            <a:r>
+              <a:rPr lang="en-US" dirty="0"/>
+              <a:t>Recipe for any Hypothesis Test</a:t>
+            </a:r>
+          </a:p>
+        </p:txBody>
+      </p:sp>
+      <p:sp>
+        <p:nvSpPr>
+          <p:cNvPr id="176133" name="Rectangle 5"/>
+          <p:cNvSpPr>
+            <a:spLocks noGrp="1" noChangeArrowheads="1"/>
+          </p:cNvSpPr>
+          <p:nvPr>
+            <p:ph type="body" idx="1"/>
+          </p:nvPr>
+        </p:nvSpPr>
+        <p:spPr>
+          <a:xfrm>
+            <a:off x="152400" y="1143000"/>
+            <a:ext cx="8763000" cy="5257800"/>
+          </a:xfrm>
+        </p:spPr>
+        <p:txBody>
+          <a:bodyPr/>
+          <a:lstStyle/>
+          <a:p>
+            <a:pPr marL="609600" indent="-609600">
+              <a:buNone/>
+            </a:pPr>
+            <a:r>
+              <a:rPr lang="en-US" sz="2400" b="1" dirty="0" smtClean="0"/>
+              <a:t>1)  </a:t>
+            </a:r>
+            <a:r>
+              <a:rPr lang="en-US" sz="2400" dirty="0"/>
+              <a:t>State the rejection criterion (</a:t>
+            </a:r>
+            <a:r>
+              <a:rPr lang="en-US" sz="2400" dirty="0">
+                <a:latin typeface="Symbol" pitchFamily="18" charset="2"/>
+              </a:rPr>
+              <a:t>a</a:t>
+            </a:r>
+            <a:r>
+              <a:rPr lang="en-US" sz="2400" dirty="0" smtClean="0"/>
+              <a:t>)</a:t>
+            </a:r>
+            <a:endParaRPr lang="en-US" sz="2400" dirty="0"/>
+          </a:p>
+          <a:p>
+            <a:pPr marL="609600" indent="-609600">
+              <a:buFontTx/>
+              <a:buNone/>
+            </a:pPr>
+            <a:r>
+              <a:rPr lang="en-US" sz="2400" b="1" dirty="0" smtClean="0"/>
+              <a:t>2)</a:t>
+            </a:r>
+            <a:r>
+              <a:rPr lang="en-US" sz="2400" dirty="0" smtClean="0"/>
+              <a:t>  State </a:t>
+            </a:r>
+            <a:r>
+              <a:rPr lang="en-US" sz="2400" dirty="0"/>
+              <a:t>the null &amp;</a:t>
+            </a:r>
+            <a:r>
+              <a:rPr lang="en-US" sz="2400" dirty="0" smtClean="0"/>
+              <a:t> </a:t>
+            </a:r>
+            <a:r>
+              <a:rPr lang="en-US" sz="2400" dirty="0"/>
+              <a:t>alternative </a:t>
+            </a:r>
+            <a:r>
+              <a:rPr lang="en-US" sz="2400" dirty="0" smtClean="0"/>
+              <a:t>hypotheses and define the parameter(s)</a:t>
+            </a:r>
+          </a:p>
+          <a:p>
+            <a:pPr marL="609600" indent="-609600">
+              <a:buFontTx/>
+              <a:buNone/>
+            </a:pPr>
+            <a:r>
+              <a:rPr lang="en-US" sz="2400" b="1" dirty="0" smtClean="0"/>
+              <a:t>3)</a:t>
+            </a:r>
+            <a:r>
+              <a:rPr lang="en-US" sz="2400" dirty="0" smtClean="0"/>
+              <a:t>  </a:t>
+            </a:r>
+            <a:r>
+              <a:rPr lang="en-US" sz="2400" dirty="0"/>
+              <a:t>Determine which test to perform – Explain!</a:t>
+            </a:r>
+          </a:p>
+          <a:p>
+            <a:pPr marL="609600" indent="-609600">
+              <a:buFontTx/>
+              <a:buNone/>
+            </a:pPr>
+            <a:r>
+              <a:rPr lang="en-US" sz="2400" b="1" dirty="0" smtClean="0"/>
+              <a:t>4</a:t>
+            </a:r>
+            <a:r>
+              <a:rPr lang="en-US" sz="2400" b="1" dirty="0"/>
+              <a:t>)</a:t>
+            </a:r>
+            <a:r>
+              <a:rPr lang="en-US" sz="2400" dirty="0"/>
+              <a:t>  Collect the </a:t>
+            </a:r>
+            <a:r>
+              <a:rPr lang="en-US" sz="2400" dirty="0" smtClean="0"/>
+              <a:t>data (address type of study and randomization)</a:t>
+            </a:r>
+            <a:endParaRPr lang="en-US" sz="2400" dirty="0"/>
+          </a:p>
+          <a:p>
+            <a:pPr marL="609600" indent="-609600">
+              <a:buFontTx/>
+              <a:buNone/>
+            </a:pPr>
+            <a:r>
+              <a:rPr lang="en-US" sz="2400" b="1" dirty="0"/>
+              <a:t>5)</a:t>
+            </a:r>
+            <a:r>
+              <a:rPr lang="en-US" sz="2400" dirty="0"/>
+              <a:t>  Check all necessary </a:t>
+            </a:r>
+            <a:r>
+              <a:rPr lang="en-US" sz="2400" dirty="0" smtClean="0"/>
+              <a:t>assumption(s)</a:t>
+            </a:r>
+            <a:endParaRPr lang="en-US" sz="2400" dirty="0"/>
+          </a:p>
+          <a:p>
+            <a:pPr marL="609600" indent="-609600">
+              <a:buFontTx/>
+              <a:buNone/>
+            </a:pPr>
+            <a:r>
+              <a:rPr lang="en-US" sz="2400" b="1" dirty="0"/>
+              <a:t>6)</a:t>
+            </a:r>
+            <a:r>
+              <a:rPr lang="en-US" sz="2400" dirty="0"/>
+              <a:t>  Calculate the appropriate </a:t>
+            </a:r>
+            <a:r>
+              <a:rPr lang="en-US" sz="2400" dirty="0" smtClean="0"/>
+              <a:t>statistic(s)</a:t>
+            </a:r>
+            <a:endParaRPr lang="en-US" sz="2400" dirty="0"/>
+          </a:p>
+          <a:p>
+            <a:pPr marL="609600" indent="-609600">
+              <a:buFontTx/>
+              <a:buNone/>
+            </a:pPr>
+            <a:r>
+              <a:rPr lang="en-US" sz="2400" b="1" dirty="0"/>
+              <a:t>7)</a:t>
+            </a:r>
+            <a:r>
+              <a:rPr lang="en-US" sz="2400" dirty="0"/>
+              <a:t>  Calculate the appropriate test statistic</a:t>
+            </a:r>
+          </a:p>
+          <a:p>
+            <a:pPr marL="609600" indent="-609600">
+              <a:buFontTx/>
+              <a:buNone/>
+            </a:pPr>
+            <a:r>
+              <a:rPr lang="en-US" sz="2400" b="1" dirty="0"/>
+              <a:t>8)</a:t>
+            </a:r>
+            <a:r>
+              <a:rPr lang="en-US" sz="2400" dirty="0"/>
+              <a:t>  Calculate the p-value</a:t>
+            </a:r>
+          </a:p>
+          <a:p>
+            <a:pPr marL="609600" indent="-609600">
+              <a:buFontTx/>
+              <a:buNone/>
+            </a:pPr>
+            <a:r>
+              <a:rPr lang="en-US" sz="2400" b="1" dirty="0"/>
+              <a:t>9)</a:t>
+            </a:r>
+            <a:r>
+              <a:rPr lang="en-US" sz="2400" dirty="0"/>
+              <a:t>  State </a:t>
+            </a:r>
+            <a:r>
+              <a:rPr lang="en-US" sz="2400" dirty="0" smtClean="0"/>
+              <a:t>your rejection </a:t>
+            </a:r>
+            <a:r>
+              <a:rPr lang="en-US" sz="2400" dirty="0"/>
+              <a:t>decision</a:t>
+            </a:r>
+          </a:p>
+          <a:p>
+            <a:pPr marL="609600" indent="-609600">
+              <a:buFontTx/>
+              <a:buNone/>
+            </a:pPr>
+            <a:r>
+              <a:rPr lang="en-US" sz="2400" b="1" dirty="0"/>
+              <a:t>10)</a:t>
+            </a:r>
+            <a:r>
+              <a:rPr lang="en-US" sz="2400" dirty="0"/>
+              <a:t> Summarize your findings in terms of the problem </a:t>
+            </a:r>
+          </a:p>
+          <a:p>
+            <a:pPr marL="609600" indent="-609600">
+              <a:buFontTx/>
+              <a:buNone/>
+            </a:pPr>
+            <a:r>
+              <a:rPr lang="en-US" sz="2400" b="1" dirty="0"/>
+              <a:t>11) If </a:t>
+            </a:r>
+            <a:r>
+              <a:rPr lang="en-US" sz="2400" b="1" dirty="0" smtClean="0"/>
+              <a:t>rejected H</a:t>
+            </a:r>
+            <a:r>
+              <a:rPr lang="en-US" sz="2400" b="1" baseline="-25000" dirty="0" smtClean="0"/>
+              <a:t>0</a:t>
+            </a:r>
+            <a:r>
+              <a:rPr lang="en-US" sz="2400" b="1" dirty="0" smtClean="0"/>
+              <a:t>, </a:t>
+            </a:r>
+            <a:r>
+              <a:rPr lang="en-US" sz="2400" dirty="0" smtClean="0"/>
+              <a:t>compute a </a:t>
+            </a:r>
+            <a:r>
+              <a:rPr lang="en-US" sz="2400" b="1" dirty="0" smtClean="0"/>
+              <a:t>100(1-</a:t>
+            </a:r>
+            <a:r>
+              <a:rPr lang="en-US" sz="2400" b="1" dirty="0" smtClean="0">
+                <a:latin typeface="Symbol" pitchFamily="18" charset="2"/>
+              </a:rPr>
+              <a:t>a</a:t>
+            </a:r>
+            <a:r>
+              <a:rPr lang="en-US" sz="2400" b="1" dirty="0" smtClean="0"/>
+              <a:t>)%</a:t>
+            </a:r>
+            <a:r>
+              <a:rPr lang="en-US" sz="2400" dirty="0" smtClean="0"/>
+              <a:t> </a:t>
+            </a:r>
+            <a:r>
+              <a:rPr lang="en-US" sz="2400" i="1" dirty="0"/>
+              <a:t>confidence region</a:t>
+            </a:r>
+            <a:r>
+              <a:rPr lang="en-US" sz="2400" dirty="0"/>
+              <a:t> for </a:t>
+            </a:r>
+            <a:r>
+              <a:rPr lang="en-US" sz="2400" dirty="0" smtClean="0"/>
+              <a:t> </a:t>
+            </a:r>
+            <a:r>
+              <a:rPr lang="en-US" sz="2400" dirty="0"/>
+              <a:t>parameter</a:t>
+            </a:r>
+          </a:p>
+        </p:txBody>
+      </p:sp>
+    </p:spTree>
+    <p:extLst>
+      <p:ext uri="{BB962C8B-B14F-4D97-AF65-F5344CB8AC3E}">
+        <p14:creationId xmlns:p14="http://schemas.microsoft.com/office/powerpoint/2010/main" val="1152679563"/>
+      </p:ext>
+    </p:extLst>
+  </p:cSld>
+  <p:clrMapOvr>
+    <a:masterClrMapping/>
+  </p:clrMapOvr>
+  <p:timing>
+    <p:tnLst>
+      <p:par>
+        <p:cTn id="1" dur="indefinite" restart="never" nodeType="tmRoot">
+          <p:childTnLst>
+            <p:seq concurrent="1" nextAc="seek">
+              <p:cTn id="2" dur="indefinite" nodeType="mainSeq">
+                <p:childTnLst>
+                  <p:par>
+                    <p:cTn id="3" fill="hold">
+                      <p:stCondLst>
+                        <p:cond delay="indefinite"/>
+                      </p:stCondLst>
+                      <p:childTnLst>
+                        <p:par>
+                          <p:cTn id="4" fill="hold">
+                            <p:stCondLst>
+                              <p:cond delay="0"/>
+                            </p:stCondLst>
+                            <p:childTnLst>
+                              <p:par>
+                                <p:cTn id="5" presetID="1" presetClass="entr" presetSubtype="0" fill="hold" grpId="0" nodeType="clickEffect">
+                                  <p:stCondLst>
+                                    <p:cond delay="0"/>
+                                  </p:stCondLst>
+                                  <p:childTnLst>
+                                    <p:set>
+                                      <p:cBhvr>
+                                        <p:cTn id="6" dur="1" fill="hold">
+                                          <p:stCondLst>
+                                            <p:cond delay="0"/>
+                                          </p:stCondLst>
+                                        </p:cTn>
+                                        <p:tgtEl>
+                                          <p:spTgt spid="176133">
+                                            <p:txEl>
+                                              <p:pRg st="0" end="0"/>
+                                            </p:txEl>
+                                          </p:spTgt>
+                                        </p:tgtEl>
+                                        <p:attrNameLst>
+                                          <p:attrName>style.visibility</p:attrName>
+                                        </p:attrNameLst>
+                                      </p:cBhvr>
+                                      <p:to>
+                                        <p:strVal val="visible"/>
+                                      </p:to>
+                                    </p:set>
+                                  </p:childTnLst>
+                                </p:cTn>
+                              </p:par>
+                              <p:par>
+                                <p:cTn id="7" presetID="1" presetClass="entr" presetSubtype="0" fill="hold" grpId="0" nodeType="withEffect">
+                                  <p:stCondLst>
+                                    <p:cond delay="0"/>
+                                  </p:stCondLst>
+                                  <p:childTnLst>
+                                    <p:set>
+                                      <p:cBhvr>
+                                        <p:cTn id="8" dur="1" fill="hold">
+                                          <p:stCondLst>
+                                            <p:cond delay="0"/>
+                                          </p:stCondLst>
+                                        </p:cTn>
+                                        <p:tgtEl>
+                                          <p:spTgt spid="176133">
+                                            <p:txEl>
+                                              <p:pRg st="1" end="1"/>
+                                            </p:txEl>
+                                          </p:spTgt>
+                                        </p:tgtEl>
+                                        <p:attrNameLst>
+                                          <p:attrName>style.visibility</p:attrName>
+                                        </p:attrNameLst>
+                                      </p:cBhvr>
+                                      <p:to>
+                                        <p:strVal val="visible"/>
+                                      </p:to>
+                                    </p:set>
+                                  </p:childTnLst>
+                                </p:cTn>
+                              </p:par>
+                              <p:par>
+                                <p:cTn id="9" presetID="1" presetClass="entr" presetSubtype="0" fill="hold" grpId="0" nodeType="withEffect">
+                                  <p:stCondLst>
+                                    <p:cond delay="0"/>
+                                  </p:stCondLst>
+                                  <p:childTnLst>
+                                    <p:set>
+                                      <p:cBhvr>
+                                        <p:cTn id="10" dur="1" fill="hold">
+                                          <p:stCondLst>
+                                            <p:cond delay="0"/>
+                                          </p:stCondLst>
+                                        </p:cTn>
+                                        <p:tgtEl>
+                                          <p:spTgt spid="176133">
+                                            <p:txEl>
+                                              <p:pRg st="2" end="2"/>
+                                            </p:txEl>
+                                          </p:spTgt>
+                                        </p:tgtEl>
+                                        <p:attrNameLst>
+                                          <p:attrName>style.visibility</p:attrName>
+                                        </p:attrNameLst>
+                                      </p:cBhvr>
+                                      <p:to>
+                                        <p:strVal val="visible"/>
+                                      </p:to>
+                                    </p:set>
+                                  </p:childTnLst>
+                                </p:cTn>
+                              </p:par>
+                              <p:par>
+                                <p:cTn id="11" presetID="1" presetClass="entr" presetSubtype="0" fill="hold" grpId="0" nodeType="withEffect">
+                                  <p:stCondLst>
+                                    <p:cond delay="0"/>
+                                  </p:stCondLst>
+                                  <p:childTnLst>
+                                    <p:set>
+                                      <p:cBhvr>
+                                        <p:cTn id="12" dur="1" fill="hold">
+                                          <p:stCondLst>
+                                            <p:cond delay="0"/>
+                                          </p:stCondLst>
+                                        </p:cTn>
+                                        <p:tgtEl>
+                                          <p:spTgt spid="176133">
+                                            <p:txEl>
+                                              <p:pRg st="3" end="3"/>
+                                            </p:txEl>
+                                          </p:spTgt>
+                                        </p:tgtEl>
+                                        <p:attrNameLst>
+                                          <p:attrName>style.visibility</p:attrName>
+                                        </p:attrNameLst>
+                                      </p:cBhvr>
+                                      <p:to>
+                                        <p:strVal val="visible"/>
+                                      </p:to>
+                                    </p:set>
+                                  </p:childTnLst>
+                                </p:cTn>
+                              </p:par>
+                              <p:par>
+                                <p:cTn id="13" presetID="1" presetClass="entr" presetSubtype="0" fill="hold" grpId="0" nodeType="withEffect">
+                                  <p:stCondLst>
+                                    <p:cond delay="0"/>
+                                  </p:stCondLst>
+                                  <p:childTnLst>
+                                    <p:set>
+                                      <p:cBhvr>
+                                        <p:cTn id="14" dur="1" fill="hold">
+                                          <p:stCondLst>
+                                            <p:cond delay="0"/>
+                                          </p:stCondLst>
+                                        </p:cTn>
+                                        <p:tgtEl>
+                                          <p:spTgt spid="176133">
+                                            <p:txEl>
+                                              <p:pRg st="4" end="4"/>
+                                            </p:txEl>
+                                          </p:spTgt>
+                                        </p:tgtEl>
+                                        <p:attrNameLst>
+                                          <p:attrName>style.visibility</p:attrName>
+                                        </p:attrNameLst>
+                                      </p:cBhvr>
+                                      <p:to>
+                                        <p:strVal val="visible"/>
+                                      </p:to>
+                                    </p:set>
+                                  </p:childTnLst>
+                                </p:cTn>
+                              </p:par>
+                              <p:par>
+                                <p:cTn id="15" presetID="1" presetClass="entr" presetSubtype="0" fill="hold" grpId="0" nodeType="withEffect">
+                                  <p:stCondLst>
+                                    <p:cond delay="0"/>
+                                  </p:stCondLst>
+                                  <p:childTnLst>
+                                    <p:set>
+                                      <p:cBhvr>
+                                        <p:cTn id="16" dur="1" fill="hold">
+                                          <p:stCondLst>
+                                            <p:cond delay="0"/>
+                                          </p:stCondLst>
+                                        </p:cTn>
+                                        <p:tgtEl>
+                                          <p:spTgt spid="176133">
+                                            <p:txEl>
+                                              <p:pRg st="5" end="5"/>
+                                            </p:txEl>
+                                          </p:spTgt>
+                                        </p:tgtEl>
+                                        <p:attrNameLst>
+                                          <p:attrName>style.visibility</p:attrName>
+                                        </p:attrNameLst>
+                                      </p:cBhvr>
+                                      <p:to>
+                                        <p:strVal val="visible"/>
+                                      </p:to>
+                                    </p:set>
+                                  </p:childTnLst>
+                                </p:cTn>
+                              </p:par>
+                              <p:par>
+                                <p:cTn id="17" presetID="1" presetClass="entr" presetSubtype="0" fill="hold" grpId="0" nodeType="withEffect">
+                                  <p:stCondLst>
+                                    <p:cond delay="0"/>
+                                  </p:stCondLst>
+                                  <p:childTnLst>
+                                    <p:set>
+                                      <p:cBhvr>
+                                        <p:cTn id="18" dur="1" fill="hold">
+                                          <p:stCondLst>
+                                            <p:cond delay="0"/>
+                                          </p:stCondLst>
+                                        </p:cTn>
+                                        <p:tgtEl>
+                                          <p:spTgt spid="176133">
+                                            <p:txEl>
+                                              <p:pRg st="6" end="6"/>
+                                            </p:txEl>
+                                          </p:spTgt>
+                                        </p:tgtEl>
+                                        <p:attrNameLst>
+                                          <p:attrName>style.visibility</p:attrName>
+                                        </p:attrNameLst>
+                                      </p:cBhvr>
+                                      <p:to>
+                                        <p:strVal val="visible"/>
+                                      </p:to>
+                                    </p:set>
+                                  </p:childTnLst>
+                                </p:cTn>
+                              </p:par>
+                              <p:par>
+                                <p:cTn id="19" presetID="1" presetClass="entr" presetSubtype="0" fill="hold" grpId="0" nodeType="withEffect">
+                                  <p:stCondLst>
+                                    <p:cond delay="0"/>
+                                  </p:stCondLst>
+                                  <p:childTnLst>
+                                    <p:set>
+                                      <p:cBhvr>
+                                        <p:cTn id="20" dur="1" fill="hold">
+                                          <p:stCondLst>
+                                            <p:cond delay="0"/>
+                                          </p:stCondLst>
+                                        </p:cTn>
+                                        <p:tgtEl>
+                                          <p:spTgt spid="176133">
+                                            <p:txEl>
+                                              <p:pRg st="7" end="7"/>
+                                            </p:txEl>
+                                          </p:spTgt>
+                                        </p:tgtEl>
+                                        <p:attrNameLst>
+                                          <p:attrName>style.visibility</p:attrName>
+                                        </p:attrNameLst>
+                                      </p:cBhvr>
+                                      <p:to>
+                                        <p:strVal val="visible"/>
+                                      </p:to>
+                                    </p:set>
+                                  </p:childTnLst>
+                                </p:cTn>
+                              </p:par>
+                              <p:par>
+                                <p:cTn id="21" presetID="1" presetClass="entr" presetSubtype="0" fill="hold" grpId="0" nodeType="withEffect">
+                                  <p:stCondLst>
+                                    <p:cond delay="0"/>
+                                  </p:stCondLst>
+                                  <p:childTnLst>
+                                    <p:set>
+                                      <p:cBhvr>
+                                        <p:cTn id="22" dur="1" fill="hold">
+                                          <p:stCondLst>
+                                            <p:cond delay="0"/>
+                                          </p:stCondLst>
+                                        </p:cTn>
+                                        <p:tgtEl>
+                                          <p:spTgt spid="176133">
+                                            <p:txEl>
+                                              <p:pRg st="8" end="8"/>
+                                            </p:txEl>
+                                          </p:spTgt>
+                                        </p:tgtEl>
+                                        <p:attrNameLst>
+                                          <p:attrName>style.visibility</p:attrName>
+                                        </p:attrNameLst>
+                                      </p:cBhvr>
+                                      <p:to>
+                                        <p:strVal val="visible"/>
+                                      </p:to>
+                                    </p:set>
+                                  </p:childTnLst>
+                                </p:cTn>
+                              </p:par>
+                              <p:par>
+                                <p:cTn id="23" presetID="1" presetClass="entr" presetSubtype="0" fill="hold" grpId="0" nodeType="withEffect">
+                                  <p:stCondLst>
+                                    <p:cond delay="0"/>
+                                  </p:stCondLst>
+                                  <p:childTnLst>
+                                    <p:set>
+                                      <p:cBhvr>
+                                        <p:cTn id="24" dur="1" fill="hold">
+                                          <p:stCondLst>
+                                            <p:cond delay="0"/>
+                                          </p:stCondLst>
+                                        </p:cTn>
+                                        <p:tgtEl>
+                                          <p:spTgt spid="176133">
+                                            <p:txEl>
+                                              <p:pRg st="9" end="9"/>
+                                            </p:txEl>
+                                          </p:spTgt>
+                                        </p:tgtEl>
+                                        <p:attrNameLst>
+                                          <p:attrName>style.visibility</p:attrName>
+                                        </p:attrNameLst>
+                                      </p:cBhvr>
+                                      <p:to>
+                                        <p:strVal val="visible"/>
+                                      </p:to>
+                                    </p:set>
+                                  </p:childTnLst>
+                                </p:cTn>
+                              </p:par>
+                              <p:par>
+                                <p:cTn id="25" presetID="1" presetClass="entr" presetSubtype="0" fill="hold" grpId="0" nodeType="withEffect">
+                                  <p:stCondLst>
+                                    <p:cond delay="0"/>
+                                  </p:stCondLst>
+                                  <p:childTnLst>
+                                    <p:set>
+                                      <p:cBhvr>
+                                        <p:cTn id="26" dur="1" fill="hold">
+                                          <p:stCondLst>
+                                            <p:cond delay="0"/>
+                                          </p:stCondLst>
+                                        </p:cTn>
+                                        <p:tgtEl>
+                                          <p:spTgt spid="176133">
+                                            <p:txEl>
+                                              <p:pRg st="10" end="10"/>
+                                            </p:txEl>
+                                          </p:spTgt>
+                                        </p:tgtEl>
+                                        <p:attrNameLst>
+                                          <p:attrName>style.visibility</p:attrName>
+                                        </p:attrNameLst>
+                                      </p:cBhvr>
+                                      <p:to>
+                                        <p:strVal val="visible"/>
+                                      </p:to>
+                                    </p:set>
+                                  </p:childTnLst>
+                                </p:cTn>
+                              </p:par>
+                              <p:par>
+                                <p:cTn id="27" presetID="1" presetClass="entr" presetSubtype="0" fill="hold" grpId="0" nodeType="withEffect">
+                                  <p:stCondLst>
+                                    <p:cond delay="0"/>
+                                  </p:stCondLst>
+                                  <p:childTnLst>
+                                    <p:set>
+                                      <p:cBhvr>
+                                        <p:cTn id="28" dur="1" fill="hold">
+                                          <p:stCondLst>
+                                            <p:cond delay="0"/>
+                                          </p:stCondLst>
+                                        </p:cTn>
+                                        <p:tgtEl>
+                                          <p:spTgt spid="176131"/>
+                                        </p:tgtEl>
+                                        <p:attrNameLst>
+                                          <p:attrName>style.visibility</p:attrName>
+                                        </p:attrNameLst>
+                                      </p:cBhvr>
+                                      <p:to>
+                                        <p:strVal val="visible"/>
+                                      </p:to>
+                                    </p:set>
+                                  </p:childTnLst>
+                                </p:cTn>
+                              </p:par>
+                              <p:par>
+                                <p:cTn id="29" presetID="1" presetClass="entr" presetSubtype="0" fill="hold" grpId="0" nodeType="withEffect">
+                                  <p:stCondLst>
+                                    <p:cond delay="0"/>
+                                  </p:stCondLst>
+                                  <p:childTnLst>
+                                    <p:set>
+                                      <p:cBhvr>
+                                        <p:cTn id="30" dur="1" fill="hold">
+                                          <p:stCondLst>
+                                            <p:cond delay="0"/>
+                                          </p:stCondLst>
+                                        </p:cTn>
+                                        <p:tgtEl>
+                                          <p:spTgt spid="176130"/>
+                                        </p:tgtEl>
+                                        <p:attrNameLst>
+                                          <p:attrName>style.visibility</p:attrName>
+                                        </p:attrNameLst>
+                                      </p:cBhvr>
+                                      <p:to>
+                                        <p:strVal val="visible"/>
+                                      </p:to>
+                                    </p:set>
+                                  </p:childTnLst>
+                                </p:cTn>
+                              </p:par>
+                            </p:childTnLst>
+                          </p:cTn>
+                        </p:par>
+                      </p:childTnLst>
+                    </p:cTn>
+                  </p:par>
+                </p:childTnLst>
+              </p:cTn>
+              <p:prevCondLst>
+                <p:cond evt="onPrev" delay="0">
+                  <p:tgtEl>
+                    <p:sldTgt/>
+                  </p:tgtEl>
+                </p:cond>
+              </p:prevCondLst>
+              <p:nextCondLst>
+                <p:cond evt="onNext" delay="0">
+                  <p:tgtEl>
+                    <p:sldTgt/>
+                  </p:tgtEl>
+                </p:cond>
+              </p:nextCondLst>
+            </p:seq>
+          </p:childTnLst>
+        </p:cTn>
+      </p:par>
+    </p:tnLst>
+    <p:bldLst>
+      <p:bldP spid="176130" grpId="0" animBg="1"/>
+      <p:bldP spid="176131" grpId="0" animBg="1"/>
+      <p:bldP spid="176133" grpId="0" build="p"/>
     </p:bldLst>
   </p:timing>
 </p:sld>
@@ -5587,4 +6625,265 @@
   <a:objectDefaults/>
   <a:extraClrSchemeLst/>
 </a:theme>
+</file>
+
+<file path=ppt/theme/theme3.xml><?xml version="1.0" encoding="utf-8"?>
+<a:theme xmlns:a="http://schemas.openxmlformats.org/drawingml/2006/main" name="Office Theme">
+  <a:themeElements>
+    <a:clrScheme name="Office">
+      <a:dk1>
+        <a:sysClr val="windowText" lastClr="000000"/>
+      </a:dk1>
+      <a:lt1>
+        <a:sysClr val="window" lastClr="FFFFFF"/>
+      </a:lt1>
+      <a:dk2>
+        <a:srgbClr val="44546A"/>
+      </a:dk2>
+      <a:lt2>
+        <a:srgbClr val="E7E6E6"/>
+      </a:lt2>
+      <a:accent1>
+        <a:srgbClr val="5B9BD5"/>
+      </a:accent1>
+      <a:accent2>
+        <a:srgbClr val="ED7D31"/>
+      </a:accent2>
+      <a:accent3>
+        <a:srgbClr val="A5A5A5"/>
+      </a:accent3>
+      <a:accent4>
+        <a:srgbClr val="FFC000"/>
+      </a:accent4>
+      <a:accent5>
+        <a:srgbClr val="4472C4"/>
+      </a:accent5>
+      <a:accent6>
+        <a:srgbClr val="70AD47"/>
+      </a:accent6>
+      <a:hlink>
+        <a:srgbClr val="0563C1"/>
+      </a:hlink>
+      <a:folHlink>
+        <a:srgbClr val="954F72"/>
+      </a:folHlink>
+    </a:clrScheme>
+    <a:fontScheme name="Office">
+      <a:majorFont>
+        <a:latin typeface="Calibri Light" panose="020F0302020204030204"/>
+        <a:ea typeface=""/>
+        <a:cs typeface=""/>
+        <a:font script="Jpan" typeface="ＭＳ Ｐゴシック"/>
+        <a:font script="Hang" typeface="맑은 고딕"/>
+        <a:font script="Hans" typeface="宋体"/>
+        <a:font script="Hant" typeface="新細明體"/>
+        <a:font script="Arab" typeface="Times New Roman"/>
+        <a:font script="Hebr" typeface="Times New Roman"/>
+        <a:font script="Thai" typeface="Angsana New"/>
+        <a:font script="Ethi" typeface="Nyala"/>
+        <a:font script="Beng" typeface="Vrinda"/>
+        <a:font script="Gujr" typeface="Shruti"/>
+        <a:font script="Khmr" typeface="MoolBoran"/>
+        <a:font script="Knda" typeface="Tunga"/>
+        <a:font script="Guru" typeface="Raavi"/>
+        <a:font script="Cans" typeface="Euphemia"/>
+        <a:font script="Cher" typeface="Plantagenet Cherokee"/>
+        <a:font script="Yiii" typeface="Microsoft Yi Baiti"/>
+        <a:font script="Tibt" typeface="Microsoft Himalaya"/>
+        <a:font script="Thaa" typeface="MV Boli"/>
+        <a:font script="Deva" typeface="Mangal"/>
+        <a:font script="Telu" typeface="Gautami"/>
+        <a:font script="Taml" typeface="Latha"/>
+        <a:font script="Syrc" typeface="Estrangelo Edessa"/>
+        <a:font script="Orya" typeface="Kalinga"/>
+        <a:font script="Mlym" typeface="Kartika"/>
+        <a:font script="Laoo" typeface="DokChampa"/>
+        <a:font script="Sinh" typeface="Iskoola Pota"/>
+        <a:font script="Mong" typeface="Mongolian Baiti"/>
+        <a:font script="Viet" typeface="Times New Roman"/>
+        <a:font script="Uigh" typeface="Microsoft Uighur"/>
+        <a:font script="Geor" typeface="Sylfaen"/>
+      </a:majorFont>
+      <a:minorFont>
+        <a:latin typeface="Calibri" panose="020F0502020204030204"/>
+        <a:ea typeface=""/>
+        <a:cs typeface=""/>
+        <a:font script="Jpan" typeface="ＭＳ Ｐゴシック"/>
+        <a:font script="Hang" typeface="맑은 고딕"/>
+        <a:font script="Hans" typeface="宋体"/>
+        <a:font script="Hant" typeface="新細明體"/>
+        <a:font script="Arab" typeface="Arial"/>
+        <a:font script="Hebr" typeface="Arial"/>
+        <a:font script="Thai" typeface="Cordia New"/>
+        <a:font script="Ethi" typeface="Nyala"/>
+        <a:font script="Beng" typeface="Vrinda"/>
+        <a:font script="Gujr" typeface="Shruti"/>
+        <a:font script="Khmr" typeface="DaunPenh"/>
+        <a:font script="Knda" typeface="Tunga"/>
+        <a:font script="Guru" typeface="Raavi"/>
+        <a:font script="Cans" typeface="Euphemia"/>
+        <a:font script="Cher" typeface="Plantagenet Cherokee"/>
+        <a:font script="Yiii" typeface="Microsoft Yi Baiti"/>
+        <a:font script="Tibt" typeface="Microsoft Himalaya"/>
+        <a:font script="Thaa" typeface="MV Boli"/>
+        <a:font script="Deva" typeface="Mangal"/>
+        <a:font script="Telu" typeface="Gautami"/>
+        <a:font script="Taml" typeface="Latha"/>
+        <a:font script="Syrc" typeface="Estrangelo Edessa"/>
+        <a:font script="Orya" typeface="Kalinga"/>
+        <a:font script="Mlym" typeface="Kartika"/>
+        <a:font script="Laoo" typeface="DokChampa"/>
+        <a:font script="Sinh" typeface="Iskoola Pota"/>
+        <a:font script="Mong" typeface="Mongolian Baiti"/>
+        <a:font script="Viet" typeface="Arial"/>
+        <a:font script="Uigh" typeface="Microsoft Uighur"/>
+        <a:font script="Geor" typeface="Sylfaen"/>
+      </a:minorFont>
+    </a:fontScheme>
+    <a:fmtScheme name="Office">
+      <a:fillStyleLst>
+        <a:solidFill>
+          <a:schemeClr val="phClr"/>
+        </a:solidFill>
+        <a:gradFill rotWithShape="1">
+          <a:gsLst>
+            <a:gs pos="0">
+              <a:schemeClr val="phClr">
+                <a:lumMod val="110000"/>
+                <a:satMod val="105000"/>
+                <a:tint val="67000"/>
+              </a:schemeClr>
+            </a:gs>
+            <a:gs pos="50000">
+              <a:schemeClr val="phClr">
+                <a:lumMod val="105000"/>
+                <a:satMod val="103000"/>
+                <a:tint val="73000"/>
+              </a:schemeClr>
+            </a:gs>
+            <a:gs pos="100000">
+              <a:schemeClr val="phClr">
+                <a:lumMod val="105000"/>
+                <a:satMod val="109000"/>
+                <a:tint val="81000"/>
+              </a:schemeClr>
+            </a:gs>
+          </a:gsLst>
+          <a:lin ang="5400000" scaled="0"/>
+        </a:gradFill>
+        <a:gradFill rotWithShape="1">
+          <a:gsLst>
+            <a:gs pos="0">
+              <a:schemeClr val="phClr">
+                <a:satMod val="103000"/>
+                <a:lumMod val="102000"/>
+                <a:tint val="94000"/>
+              </a:schemeClr>
+            </a:gs>
+            <a:gs pos="50000">
+              <a:schemeClr val="phClr">
+                <a:satMod val="110000"/>
+                <a:lumMod val="100000"/>
+                <a:shade val="100000"/>
+              </a:schemeClr>
+            </a:gs>
+            <a:gs pos="100000">
+              <a:schemeClr val="phClr">
+                <a:lumMod val="99000"/>
+                <a:satMod val="120000"/>
+                <a:shade val="78000"/>
+              </a:schemeClr>
+            </a:gs>
+          </a:gsLst>
+          <a:lin ang="5400000" scaled="0"/>
+        </a:gradFill>
+      </a:fillStyleLst>
+      <a:lnStyleLst>
+        <a:ln w="6350" cap="flat" cmpd="sng" algn="ctr">
+          <a:solidFill>
+            <a:schemeClr val="phClr"/>
+          </a:solidFill>
+          <a:prstDash val="solid"/>
+          <a:miter lim="800000"/>
+        </a:ln>
+        <a:ln w="12700" cap="flat" cmpd="sng" algn="ctr">
+          <a:solidFill>
+            <a:schemeClr val="phClr"/>
+          </a:solidFill>
+          <a:prstDash val="solid"/>
+          <a:miter lim="800000"/>
+        </a:ln>
+        <a:ln w="19050" cap="flat" cmpd="sng" algn="ctr">
+          <a:solidFill>
+            <a:schemeClr val="phClr"/>
+          </a:solidFill>
+          <a:prstDash val="solid"/>
+          <a:miter lim="800000"/>
+        </a:ln>
+      </a:lnStyleLst>
+      <a:effectStyleLst>
+        <a:effectStyle>
+          <a:effectLst/>
+        </a:effectStyle>
+        <a:effectStyle>
+          <a:effectLst/>
+        </a:effectStyle>
+        <a:effectStyle>
+          <a:effectLst>
+            <a:outerShdw blurRad="57150" dist="19050" dir="5400000" algn="ctr" rotWithShape="0">
+              <a:srgbClr val="000000">
+                <a:alpha val="63000"/>
+              </a:srgbClr>
+            </a:outerShdw>
+          </a:effectLst>
+        </a:effectStyle>
+      </a:effectStyleLst>
+      <a:bgFillStyleLst>
+        <a:solidFill>
+          <a:schemeClr val="phClr"/>
+        </a:solidFill>
+        <a:solidFill>
+          <a:schemeClr val="phClr">
+            <a:tint val="95000"/>
+            <a:satMod val="170000"/>
+          </a:schemeClr>
+        </a:solidFill>
+        <a:gradFill rotWithShape="1">
+          <a:gsLst>
+            <a:gs pos="0">
+              <a:schemeClr val="phClr">
+                <a:tint val="93000"/>
+                <a:satMod val="150000"/>
+                <a:shade val="98000"/>
+                <a:lumMod val="102000"/>
+              </a:schemeClr>
+            </a:gs>
+            <a:gs pos="50000">
+              <a:schemeClr val="phClr">
+                <a:tint val="98000"/>
+                <a:satMod val="130000"/>
+                <a:shade val="90000"/>
+                <a:lumMod val="103000"/>
+              </a:schemeClr>
+            </a:gs>
+            <a:gs pos="100000">
+              <a:schemeClr val="phClr">
+                <a:shade val="63000"/>
+                <a:satMod val="120000"/>
+              </a:schemeClr>
+            </a:gs>
+          </a:gsLst>
+          <a:lin ang="5400000" scaled="0"/>
+        </a:gradFill>
+      </a:bgFillStyleLst>
+    </a:fmtScheme>
+  </a:themeElements>
+  <a:objectDefaults/>
+  <a:extraClrSchemeLst/>
+  <a:extLst>
+    <a:ext uri="{05A4C25C-085E-4340-85A3-A5531E510DB2}">
+      <thm15:themeFamily xmlns:thm15="http://schemas.microsoft.com/office/thememl/2012/main" name="Office Theme" id="{62F939B6-93AF-4DB8-9C6B-D6C7DFDC589F}" vid="{4A3C46E8-61CC-4603-A589-7422A47A8E4A}"/>
+    </a:ext>
+  </a:extLst>
+</a:theme>
 </file>
</xml_diff>